<commit_message>
actualizacion informe y aplicativos
</commit_message>
<xml_diff>
--- a/HilosJava_Grupo2/DOCUMENTACION/HilosJava_168_169_170_Grupo2.pptx
+++ b/HilosJava_Grupo2/DOCUMENTACION/HilosJava_168_169_170_Grupo2.pptx
@@ -2620,7 +2620,7 @@
           <a:p>
             <a:fld id="{3E0690D5-D519-41DB-B4EF-34C6DC34EE12}" type="datetimeFigureOut">
               <a:rPr lang="es-ES" smtClean="0"/>
-              <a:t>27/11/2022</a:t>
+              <a:t>10/07/2023</a:t>
             </a:fld>
             <a:endParaRPr lang="es-ES"/>
           </a:p>
@@ -3133,7 +3133,7 @@
             <a:fld id="{B61BEF0D-F0BB-DE4B-95CE-6DB70DBA9567}" type="datetimeFigureOut">
               <a:rPr lang="en-US" smtClean="0"/>
               <a:pPr/>
-              <a:t>11/27/2022</a:t>
+              <a:t>7/10/2023</a:t>
             </a:fld>
             <a:endParaRPr lang="en-US"/>
           </a:p>
@@ -3397,7 +3397,7 @@
             <a:fld id="{B61BEF0D-F0BB-DE4B-95CE-6DB70DBA9567}" type="datetimeFigureOut">
               <a:rPr lang="en-US" smtClean="0"/>
               <a:pPr/>
-              <a:t>11/27/2022</a:t>
+              <a:t>7/10/2023</a:t>
             </a:fld>
             <a:endParaRPr lang="en-US"/>
           </a:p>
@@ -3634,7 +3634,7 @@
             <a:fld id="{B61BEF0D-F0BB-DE4B-95CE-6DB70DBA9567}" type="datetimeFigureOut">
               <a:rPr lang="en-US" smtClean="0"/>
               <a:pPr/>
-              <a:t>11/27/2022</a:t>
+              <a:t>7/10/2023</a:t>
             </a:fld>
             <a:endParaRPr lang="en-US"/>
           </a:p>
@@ -3876,7 +3876,7 @@
             <a:fld id="{B61BEF0D-F0BB-DE4B-95CE-6DB70DBA9567}" type="datetimeFigureOut">
               <a:rPr lang="en-US" smtClean="0"/>
               <a:pPr/>
-              <a:t>11/27/2022</a:t>
+              <a:t>7/10/2023</a:t>
             </a:fld>
             <a:endParaRPr lang="en-US"/>
           </a:p>
@@ -4185,7 +4185,7 @@
             <a:fld id="{B61BEF0D-F0BB-DE4B-95CE-6DB70DBA9567}" type="datetimeFigureOut">
               <a:rPr lang="en-US" smtClean="0"/>
               <a:pPr/>
-              <a:t>11/27/2022</a:t>
+              <a:t>7/10/2023</a:t>
             </a:fld>
             <a:endParaRPr lang="en-US"/>
           </a:p>
@@ -4489,7 +4489,7 @@
             <a:fld id="{B61BEF0D-F0BB-DE4B-95CE-6DB70DBA9567}" type="datetimeFigureOut">
               <a:rPr lang="en-US" smtClean="0"/>
               <a:pPr/>
-              <a:t>11/27/2022</a:t>
+              <a:t>7/10/2023</a:t>
             </a:fld>
             <a:endParaRPr lang="en-US"/>
           </a:p>
@@ -4913,7 +4913,7 @@
             <a:fld id="{B61BEF0D-F0BB-DE4B-95CE-6DB70DBA9567}" type="datetimeFigureOut">
               <a:rPr lang="en-US" smtClean="0"/>
               <a:pPr/>
-              <a:t>11/27/2022</a:t>
+              <a:t>7/10/2023</a:t>
             </a:fld>
             <a:endParaRPr lang="en-US"/>
           </a:p>
@@ -5010,7 +5010,7 @@
             <a:fld id="{B61BEF0D-F0BB-DE4B-95CE-6DB70DBA9567}" type="datetimeFigureOut">
               <a:rPr lang="en-US" smtClean="0"/>
               <a:pPr/>
-              <a:t>11/27/2022</a:t>
+              <a:t>7/10/2023</a:t>
             </a:fld>
             <a:endParaRPr lang="en-US"/>
           </a:p>
@@ -5174,7 +5174,7 @@
             <a:fld id="{B61BEF0D-F0BB-DE4B-95CE-6DB70DBA9567}" type="datetimeFigureOut">
               <a:rPr lang="en-US" smtClean="0"/>
               <a:pPr/>
-              <a:t>11/27/2022</a:t>
+              <a:t>7/10/2023</a:t>
             </a:fld>
             <a:endParaRPr lang="en-US"/>
           </a:p>
@@ -5554,7 +5554,7 @@
             <a:fld id="{B61BEF0D-F0BB-DE4B-95CE-6DB70DBA9567}" type="datetimeFigureOut">
               <a:rPr lang="en-US" smtClean="0"/>
               <a:pPr/>
-              <a:t>11/27/2022</a:t>
+              <a:t>7/10/2023</a:t>
             </a:fld>
             <a:endParaRPr lang="en-US"/>
           </a:p>
@@ -5845,7 +5845,7 @@
             <a:fld id="{B61BEF0D-F0BB-DE4B-95CE-6DB70DBA9567}" type="datetimeFigureOut">
               <a:rPr lang="en-US" smtClean="0"/>
               <a:pPr/>
-              <a:t>11/27/2022</a:t>
+              <a:t>7/10/2023</a:t>
             </a:fld>
             <a:endParaRPr lang="en-US"/>
           </a:p>
@@ -6058,7 +6058,7 @@
             <a:fld id="{B61BEF0D-F0BB-DE4B-95CE-6DB70DBA9567}" type="datetimeFigureOut">
               <a:rPr lang="en-US" smtClean="0"/>
               <a:pPr/>
-              <a:t>11/27/2022</a:t>
+              <a:t>7/10/2023</a:t>
             </a:fld>
             <a:endParaRPr lang="en-US"/>
           </a:p>
@@ -6724,46 +6724,98 @@
         </p:spPr>
         <p:txBody>
           <a:bodyPr>
-            <a:normAutofit/>
+            <a:normAutofit lnSpcReduction="10000"/>
           </a:bodyPr>
           <a:lstStyle/>
           <a:p>
+            <a:pPr algn="l" rtl="0" fontAlgn="base"/>
             <a:r>
-              <a:rPr lang="es-EC" b="1" dirty="0">
+              <a:rPr lang="es-EC" sz="1800" b="1" i="0" u="none" strike="noStrike" cap="all" dirty="0">
                 <a:solidFill>
-                  <a:schemeClr val="bg1"/>
+                  <a:srgbClr val="FFFFFF"/>
                 </a:solidFill>
+                <a:effectLst/>
+                <a:latin typeface="Gill Sans MT" panose="020B0502020104020203" pitchFamily="34" charset="0"/>
               </a:rPr>
-              <a:t>Integrantes: </a:t>
+              <a:t>INTEGRANTES: </a:t>
             </a:r>
             <a:r>
-              <a:rPr lang="es-EC" dirty="0">
+              <a:rPr lang="es-EC" sz="1800" b="0" i="0" u="none" strike="noStrike" cap="all" dirty="0">
                 <a:solidFill>
-                  <a:schemeClr val="bg1"/>
+                  <a:srgbClr val="FFFFFF"/>
                 </a:solidFill>
+                <a:effectLst/>
+                <a:latin typeface="Gill Sans MT" panose="020B0502020104020203" pitchFamily="34" charset="0"/>
               </a:rPr>
-              <a:t>Ricardo morales</a:t>
+              <a:t>ADRIÁN MOSQUERA</a:t>
             </a:r>
+            <a:r>
+              <a:rPr lang="en-US" sz="1800" b="0" i="0" dirty="0">
+                <a:solidFill>
+                  <a:srgbClr val="FFFFFF"/>
+                </a:solidFill>
+                <a:effectLst/>
+                <a:latin typeface="Gill Sans MT" panose="020B0502020104020203" pitchFamily="34" charset="0"/>
+              </a:rPr>
+              <a:t>​</a:t>
+            </a:r>
+            <a:endParaRPr lang="en-US" b="0" i="0" dirty="0">
+              <a:solidFill>
+                <a:srgbClr val="000000"/>
+              </a:solidFill>
+              <a:effectLst/>
+              <a:latin typeface="Segoe UI" panose="020B0502040204020203" pitchFamily="34" charset="0"/>
+            </a:endParaRPr>
           </a:p>
           <a:p>
+            <a:pPr algn="l" rtl="0" fontAlgn="base"/>
             <a:r>
-              <a:rPr lang="es-EC" dirty="0">
+              <a:rPr lang="es-EC" sz="1800" b="0" i="0" u="none" strike="noStrike" cap="all" dirty="0">
                 <a:solidFill>
-                  <a:schemeClr val="bg1"/>
+                  <a:srgbClr val="FFFFFF"/>
                 </a:solidFill>
+                <a:effectLst/>
+                <a:latin typeface="Gill Sans MT" panose="020B0502020104020203" pitchFamily="34" charset="0"/>
               </a:rPr>
-              <a:t>                            CHRISTIAN NOVOA</a:t>
+              <a:t>                            ANDRES PALLANGO</a:t>
             </a:r>
+            <a:r>
+              <a:rPr lang="en-US" sz="1800" b="0" i="0" dirty="0">
+                <a:solidFill>
+                  <a:srgbClr val="FFFFFF"/>
+                </a:solidFill>
+                <a:effectLst/>
+                <a:latin typeface="Gill Sans MT" panose="020B0502020104020203" pitchFamily="34" charset="0"/>
+              </a:rPr>
+              <a:t>​</a:t>
+            </a:r>
+            <a:endParaRPr lang="en-US" b="0" i="0" dirty="0">
+              <a:solidFill>
+                <a:srgbClr val="000000"/>
+              </a:solidFill>
+              <a:effectLst/>
+              <a:latin typeface="Segoe UI" panose="020B0502040204020203" pitchFamily="34" charset="0"/>
+            </a:endParaRPr>
           </a:p>
           <a:p>
+            <a:pPr algn="l" rtl="0" fontAlgn="base"/>
             <a:r>
-              <a:rPr lang="es-EC" dirty="0">
+              <a:rPr lang="es-EC" sz="1800" b="0" i="0" u="none" strike="noStrike" cap="all" dirty="0">
                 <a:solidFill>
-                  <a:schemeClr val="bg1"/>
+                  <a:srgbClr val="FFFFFF"/>
                 </a:solidFill>
+                <a:effectLst/>
+                <a:latin typeface="Gill Sans MT" panose="020B0502020104020203" pitchFamily="34" charset="0"/>
               </a:rPr>
-              <a:t>                            DIEGO PADILLA</a:t>
+              <a:t>                            PAÚL SÁNCHEZ</a:t>
             </a:r>
+            <a:endParaRPr lang="en-US" b="0" i="0" dirty="0">
+              <a:solidFill>
+                <a:srgbClr val="000000"/>
+              </a:solidFill>
+              <a:effectLst/>
+              <a:latin typeface="Segoe UI" panose="020B0502040204020203" pitchFamily="34" charset="0"/>
+            </a:endParaRPr>
           </a:p>
           <a:p>
             <a:endParaRPr lang="es-EC" dirty="0">
@@ -7079,7 +7131,7 @@
                   <a:schemeClr val="bg1"/>
                 </a:solidFill>
               </a:rPr>
-              <a:t>8338</a:t>
+              <a:t>9877</a:t>
             </a:r>
           </a:p>
           <a:p>
@@ -7089,16 +7141,13 @@
                   <a:schemeClr val="bg1"/>
                 </a:solidFill>
               </a:rPr>
-              <a:t>FECHA: 26</a:t>
+              <a:t>FECHA: 10/07/2023</a:t>
             </a:r>
-            <a:r>
-              <a:rPr lang="es-EC" dirty="0">
-                <a:solidFill>
-                  <a:schemeClr val="bg1"/>
-                </a:solidFill>
-              </a:rPr>
-              <a:t>/11/2022</a:t>
-            </a:r>
+            <a:endParaRPr lang="es-EC" dirty="0">
+              <a:solidFill>
+                <a:schemeClr val="bg1"/>
+              </a:solidFill>
+            </a:endParaRPr>
           </a:p>
           <a:p>
             <a:r>
@@ -7311,6 +7360,13 @@
             <a:schemeClr val="lt1"/>
           </a:fontRef>
         </p:style>
+        <p:txBody>
+          <a:bodyPr/>
+          <a:lstStyle/>
+          <a:p>
+            <a:endParaRPr lang="es-EC"/>
+          </a:p>
+        </p:txBody>
       </p:sp>
       <p:sp>
         <p:nvSpPr>
@@ -7365,6 +7421,13 @@
             <a:schemeClr val="lt1"/>
           </a:fontRef>
         </p:style>
+        <p:txBody>
+          <a:bodyPr/>
+          <a:lstStyle/>
+          <a:p>
+            <a:endParaRPr lang="es-EC"/>
+          </a:p>
+        </p:txBody>
       </p:sp>
       <p:sp>
         <p:nvSpPr>
@@ -7503,11 +7566,11 @@
             </a:r>
             <a:r>
               <a:rPr lang="en-US" dirty="0" err="1"/>
-              <a:t>creaci</a:t>
+              <a:t>creacion</a:t>
             </a:r>
             <a:r>
               <a:rPr lang="en-US" dirty="0"/>
-              <a:t>[on de un </a:t>
+              <a:t> de un </a:t>
             </a:r>
             <a:r>
               <a:rPr lang="en-US" dirty="0" err="1"/>
@@ -7754,7 +7817,7 @@
                   <a:schemeClr val="tx1"/>
                 </a:solidFill>
               </a:rPr>
-              <a:t> -&gt; Web </a:t>
+              <a:t> -&gt; Java </a:t>
             </a:r>
             <a:r>
               <a:rPr lang="es-ES" dirty="0" err="1">
@@ -7811,42 +7874,6 @@
           </a:p>
         </p:txBody>
       </p:sp>
-      <p:pic>
-        <p:nvPicPr>
-          <p:cNvPr id="7" name="Picture 1668937193">
-            <a:extLst>
-              <a:ext uri="{FF2B5EF4-FFF2-40B4-BE49-F238E27FC236}">
-                <a16:creationId xmlns:a16="http://schemas.microsoft.com/office/drawing/2014/main" id="{6CE2B7FD-7636-C38D-FD6E-59164B2F76D3}"/>
-              </a:ext>
-            </a:extLst>
-          </p:cNvPr>
-          <p:cNvPicPr>
-            <a:picLocks noChangeAspect="1"/>
-          </p:cNvPicPr>
-          <p:nvPr/>
-        </p:nvPicPr>
-        <p:blipFill>
-          <a:blip r:embed="rId2">
-            <a:extLst>
-              <a:ext uri="{28A0092B-C50C-407E-A947-70E740481C1C}">
-                <a14:useLocalDpi xmlns:a14="http://schemas.microsoft.com/office/drawing/2010/main" val="0"/>
-              </a:ext>
-            </a:extLst>
-          </a:blip>
-          <a:stretch>
-            <a:fillRect/>
-          </a:stretch>
-        </p:blipFill>
-        <p:spPr>
-          <a:xfrm>
-            <a:off x="3366423" y="2277286"/>
-            <a:ext cx="5278103" cy="3683676"/>
-          </a:xfrm>
-          <a:prstGeom prst="rect">
-            <a:avLst/>
-          </a:prstGeom>
-        </p:spPr>
-      </p:pic>
       <p:sp>
         <p:nvSpPr>
           <p:cNvPr id="12" name="CuadroTexto 11">
@@ -8456,6 +8483,36 @@
           </p:txBody>
         </p:sp>
       </p:grpSp>
+      <p:pic>
+        <p:nvPicPr>
+          <p:cNvPr id="16" name="Imagen 15">
+            <a:extLst>
+              <a:ext uri="{FF2B5EF4-FFF2-40B4-BE49-F238E27FC236}">
+                <a16:creationId xmlns:a16="http://schemas.microsoft.com/office/drawing/2014/main" id="{901D802C-09A2-DD6C-A72A-A61FC9FCAF8D}"/>
+              </a:ext>
+            </a:extLst>
+          </p:cNvPr>
+          <p:cNvPicPr>
+            <a:picLocks noChangeAspect="1"/>
+          </p:cNvPicPr>
+          <p:nvPr/>
+        </p:nvPicPr>
+        <p:blipFill>
+          <a:blip r:embed="rId2"/>
+          <a:stretch>
+            <a:fillRect/>
+          </a:stretch>
+        </p:blipFill>
+        <p:spPr>
+          <a:xfrm>
+            <a:off x="3040640" y="2180495"/>
+            <a:ext cx="6058410" cy="4186570"/>
+          </a:xfrm>
+          <a:prstGeom prst="rect">
+            <a:avLst/>
+          </a:prstGeom>
+        </p:spPr>
+      </p:pic>
     </p:spTree>
     <p:extLst>
       <p:ext uri="{BB962C8B-B14F-4D97-AF65-F5344CB8AC3E}">
@@ -8607,6 +8664,13 @@
             <a:schemeClr val="lt1"/>
           </a:fontRef>
         </p:style>
+        <p:txBody>
+          <a:bodyPr/>
+          <a:lstStyle/>
+          <a:p>
+            <a:endParaRPr lang="es-EC"/>
+          </a:p>
+        </p:txBody>
       </p:sp>
       <p:sp>
         <p:nvSpPr>
@@ -8627,7 +8691,7 @@
         <p:spPr>
           <a:xfrm>
             <a:off x="601255" y="792480"/>
-            <a:ext cx="3409782" cy="5208270"/>
+            <a:ext cx="2427695" cy="5208270"/>
           </a:xfrm>
         </p:spPr>
         <p:txBody>
@@ -8794,8 +8858,8 @@
         </p:nvGrpSpPr>
         <p:grpSpPr>
           <a:xfrm>
-            <a:off x="9127125" y="0"/>
-            <a:ext cx="3092950" cy="6858000"/>
+            <a:off x="9644063" y="0"/>
+            <a:ext cx="2576012" cy="6858000"/>
             <a:chOff x="9127125" y="0"/>
             <a:chExt cx="3092950" cy="6858000"/>
           </a:xfrm>
@@ -9351,14 +9415,16 @@
       </p:grpSp>
       <p:pic>
         <p:nvPicPr>
-          <p:cNvPr id="13" name="Imagen 12">
+          <p:cNvPr id="9" name="Imagen 8">
             <a:extLst>
               <a:ext uri="{FF2B5EF4-FFF2-40B4-BE49-F238E27FC236}">
-                <a16:creationId xmlns:a16="http://schemas.microsoft.com/office/drawing/2014/main" id="{1CE5BAB5-8205-406E-AA87-075F58B7383B}"/>
+                <a16:creationId xmlns:a16="http://schemas.microsoft.com/office/drawing/2014/main" id="{52FC9ED4-9CC9-C208-9680-C492C9BDAB5B}"/>
               </a:ext>
             </a:extLst>
           </p:cNvPr>
-          <p:cNvPicPr/>
+          <p:cNvPicPr>
+            <a:picLocks noChangeAspect="1"/>
+          </p:cNvPicPr>
           <p:nvPr/>
         </p:nvPicPr>
         <p:blipFill>
@@ -9369,24 +9435,12 @@
         </p:blipFill>
         <p:spPr>
           <a:xfrm>
-            <a:off x="4254446" y="1743400"/>
-            <a:ext cx="4790318" cy="3371200"/>
+            <a:off x="4128504" y="1822488"/>
+            <a:ext cx="5536910" cy="3827428"/>
           </a:xfrm>
           <a:prstGeom prst="rect">
             <a:avLst/>
           </a:prstGeom>
-          <a:ln w="88900" cap="sq" cmpd="thickThin">
-            <a:solidFill>
-              <a:srgbClr val="000000"/>
-            </a:solidFill>
-            <a:prstDash val="solid"/>
-            <a:miter lim="800000"/>
-          </a:ln>
-          <a:effectLst>
-            <a:innerShdw blurRad="76200">
-              <a:srgbClr val="000000"/>
-            </a:innerShdw>
-          </a:effectLst>
         </p:spPr>
       </p:pic>
     </p:spTree>
@@ -9540,6 +9594,13 @@
             <a:schemeClr val="lt1"/>
           </a:fontRef>
         </p:style>
+        <p:txBody>
+          <a:bodyPr/>
+          <a:lstStyle/>
+          <a:p>
+            <a:endParaRPr lang="es-EC"/>
+          </a:p>
+        </p:txBody>
       </p:sp>
       <p:sp>
         <p:nvSpPr>
@@ -9560,7 +9621,7 @@
         <p:spPr>
           <a:xfrm>
             <a:off x="601255" y="792480"/>
-            <a:ext cx="3409782" cy="5208270"/>
+            <a:ext cx="3099208" cy="5208270"/>
           </a:xfrm>
         </p:spPr>
         <p:txBody>
@@ -10267,14 +10328,16 @@
       </p:grpSp>
       <p:pic>
         <p:nvPicPr>
-          <p:cNvPr id="11" name="Imagen 10">
+          <p:cNvPr id="4" name="Imagen 3">
             <a:extLst>
               <a:ext uri="{FF2B5EF4-FFF2-40B4-BE49-F238E27FC236}">
-                <a16:creationId xmlns:a16="http://schemas.microsoft.com/office/drawing/2014/main" id="{3F077F2D-B6DF-470B-9F39-851455DC866E}"/>
+                <a16:creationId xmlns:a16="http://schemas.microsoft.com/office/drawing/2014/main" id="{1A06A874-BC67-5D79-C993-A5D258E60832}"/>
               </a:ext>
             </a:extLst>
           </p:cNvPr>
-          <p:cNvPicPr/>
+          <p:cNvPicPr>
+            <a:picLocks noChangeAspect="1"/>
+          </p:cNvPicPr>
           <p:nvPr/>
         </p:nvPicPr>
         <p:blipFill>
@@ -10285,24 +10348,12 @@
         </p:blipFill>
         <p:spPr>
           <a:xfrm>
-            <a:off x="4174125" y="1965278"/>
-            <a:ext cx="4953000" cy="2892472"/>
+            <a:off x="4399802" y="1752344"/>
+            <a:ext cx="4477375" cy="3667637"/>
           </a:xfrm>
           <a:prstGeom prst="rect">
             <a:avLst/>
           </a:prstGeom>
-          <a:ln w="88900" cap="sq" cmpd="thickThin">
-            <a:solidFill>
-              <a:srgbClr val="000000"/>
-            </a:solidFill>
-            <a:prstDash val="solid"/>
-            <a:miter lim="800000"/>
-          </a:ln>
-          <a:effectLst>
-            <a:innerShdw blurRad="76200">
-              <a:srgbClr val="000000"/>
-            </a:innerShdw>
-          </a:effectLst>
         </p:spPr>
       </p:pic>
     </p:spTree>
@@ -11107,14 +11158,16 @@
       </p:grpSp>
       <p:pic>
         <p:nvPicPr>
-          <p:cNvPr id="10" name="Imagen 9">
+          <p:cNvPr id="5" name="Imagen 4">
             <a:extLst>
               <a:ext uri="{FF2B5EF4-FFF2-40B4-BE49-F238E27FC236}">
-                <a16:creationId xmlns:a16="http://schemas.microsoft.com/office/drawing/2014/main" id="{DD3832DE-341B-4EAA-8D02-3D6FE7811857}"/>
+                <a16:creationId xmlns:a16="http://schemas.microsoft.com/office/drawing/2014/main" id="{11FCD25F-0C8D-24E1-EC41-222313D0717C}"/>
               </a:ext>
             </a:extLst>
           </p:cNvPr>
-          <p:cNvPicPr/>
+          <p:cNvPicPr>
+            <a:picLocks noChangeAspect="1"/>
+          </p:cNvPicPr>
           <p:nvPr/>
         </p:nvPicPr>
         <p:blipFill>
@@ -11125,24 +11178,12 @@
         </p:blipFill>
         <p:spPr>
           <a:xfrm>
-            <a:off x="2133947" y="2836242"/>
-            <a:ext cx="5440424" cy="3733471"/>
+            <a:off x="1787950" y="2788917"/>
+            <a:ext cx="6262845" cy="4345288"/>
           </a:xfrm>
           <a:prstGeom prst="rect">
             <a:avLst/>
           </a:prstGeom>
-          <a:ln w="88900" cap="sq" cmpd="thickThin">
-            <a:solidFill>
-              <a:srgbClr val="000000"/>
-            </a:solidFill>
-            <a:prstDash val="solid"/>
-            <a:miter lim="800000"/>
-          </a:ln>
-          <a:effectLst>
-            <a:innerShdw blurRad="76200">
-              <a:srgbClr val="000000"/>
-            </a:innerShdw>
-          </a:effectLst>
         </p:spPr>
       </p:pic>
     </p:spTree>
@@ -11944,14 +11985,16 @@
       </p:grpSp>
       <p:pic>
         <p:nvPicPr>
-          <p:cNvPr id="10" name="Imagen 9">
+          <p:cNvPr id="5" name="Imagen 4">
             <a:extLst>
               <a:ext uri="{FF2B5EF4-FFF2-40B4-BE49-F238E27FC236}">
-                <a16:creationId xmlns:a16="http://schemas.microsoft.com/office/drawing/2014/main" id="{EF6C417C-0853-46FC-8E8D-D5E60C1CDB3C}"/>
+                <a16:creationId xmlns:a16="http://schemas.microsoft.com/office/drawing/2014/main" id="{F24AF5C4-E331-98D5-1CB3-F134871DFD95}"/>
               </a:ext>
             </a:extLst>
           </p:cNvPr>
-          <p:cNvPicPr/>
+          <p:cNvPicPr>
+            <a:picLocks noChangeAspect="1"/>
+          </p:cNvPicPr>
           <p:nvPr/>
         </p:nvPicPr>
         <p:blipFill>
@@ -11962,24 +12005,12 @@
         </p:blipFill>
         <p:spPr>
           <a:xfrm>
-            <a:off x="1909833" y="2766813"/>
-            <a:ext cx="6142346" cy="3691077"/>
+            <a:off x="1855992" y="2704793"/>
+            <a:ext cx="5982535" cy="4391638"/>
           </a:xfrm>
           <a:prstGeom prst="rect">
             <a:avLst/>
           </a:prstGeom>
-          <a:ln w="88900" cap="sq" cmpd="thickThin">
-            <a:solidFill>
-              <a:srgbClr val="000000"/>
-            </a:solidFill>
-            <a:prstDash val="solid"/>
-            <a:miter lim="800000"/>
-          </a:ln>
-          <a:effectLst>
-            <a:innerShdw blurRad="76200">
-              <a:srgbClr val="000000"/>
-            </a:innerShdw>
-          </a:effectLst>
         </p:spPr>
       </p:pic>
     </p:spTree>
@@ -12762,14 +12793,16 @@
       </p:grpSp>
       <p:pic>
         <p:nvPicPr>
-          <p:cNvPr id="11" name="Imagen 10">
+          <p:cNvPr id="5" name="Imagen 4">
             <a:extLst>
               <a:ext uri="{FF2B5EF4-FFF2-40B4-BE49-F238E27FC236}">
-                <a16:creationId xmlns:a16="http://schemas.microsoft.com/office/drawing/2014/main" id="{BE6EF7E2-FCB0-42EE-BD48-4541D0698135}"/>
+                <a16:creationId xmlns:a16="http://schemas.microsoft.com/office/drawing/2014/main" id="{E869D3CC-4B91-A099-4755-AAFBE1336C5D}"/>
               </a:ext>
             </a:extLst>
           </p:cNvPr>
-          <p:cNvPicPr/>
+          <p:cNvPicPr>
+            <a:picLocks noChangeAspect="1"/>
+          </p:cNvPicPr>
           <p:nvPr/>
         </p:nvPicPr>
         <p:blipFill>
@@ -12780,64 +12813,12 @@
         </p:blipFill>
         <p:spPr>
           <a:xfrm>
-            <a:off x="581192" y="3100768"/>
-            <a:ext cx="4140933" cy="3055076"/>
+            <a:off x="423816" y="2647511"/>
+            <a:ext cx="8613943" cy="4180009"/>
           </a:xfrm>
           <a:prstGeom prst="rect">
             <a:avLst/>
           </a:prstGeom>
-          <a:ln w="88900" cap="sq" cmpd="thickThin">
-            <a:solidFill>
-              <a:srgbClr val="000000"/>
-            </a:solidFill>
-            <a:prstDash val="solid"/>
-            <a:miter lim="800000"/>
-          </a:ln>
-          <a:effectLst>
-            <a:innerShdw blurRad="76200">
-              <a:srgbClr val="000000"/>
-            </a:innerShdw>
-          </a:effectLst>
-        </p:spPr>
-      </p:pic>
-      <p:pic>
-        <p:nvPicPr>
-          <p:cNvPr id="12" name="Imagen 11">
-            <a:extLst>
-              <a:ext uri="{FF2B5EF4-FFF2-40B4-BE49-F238E27FC236}">
-                <a16:creationId xmlns:a16="http://schemas.microsoft.com/office/drawing/2014/main" id="{7C0F65B2-D96F-4760-91F6-B9AB0868F403}"/>
-              </a:ext>
-            </a:extLst>
-          </p:cNvPr>
-          <p:cNvPicPr/>
-          <p:nvPr/>
-        </p:nvPicPr>
-        <p:blipFill>
-          <a:blip r:embed="rId3"/>
-          <a:stretch>
-            <a:fillRect/>
-          </a:stretch>
-        </p:blipFill>
-        <p:spPr>
-          <a:xfrm>
-            <a:off x="4850164" y="3100767"/>
-            <a:ext cx="4140933" cy="3055075"/>
-          </a:xfrm>
-          <a:prstGeom prst="rect">
-            <a:avLst/>
-          </a:prstGeom>
-          <a:ln w="88900" cap="sq" cmpd="thickThin">
-            <a:solidFill>
-              <a:srgbClr val="000000"/>
-            </a:solidFill>
-            <a:prstDash val="solid"/>
-            <a:miter lim="800000"/>
-          </a:ln>
-          <a:effectLst>
-            <a:innerShdw blurRad="76200">
-              <a:srgbClr val="000000"/>
-            </a:innerShdw>
-          </a:effectLst>
         </p:spPr>
       </p:pic>
     </p:spTree>
@@ -13620,14 +13601,16 @@
       </p:grpSp>
       <p:pic>
         <p:nvPicPr>
-          <p:cNvPr id="10" name="Imagen 9">
+          <p:cNvPr id="5" name="Imagen 4">
             <a:extLst>
               <a:ext uri="{FF2B5EF4-FFF2-40B4-BE49-F238E27FC236}">
-                <a16:creationId xmlns:a16="http://schemas.microsoft.com/office/drawing/2014/main" id="{EF6C417C-0853-46FC-8E8D-D5E60C1CDB3C}"/>
+                <a16:creationId xmlns:a16="http://schemas.microsoft.com/office/drawing/2014/main" id="{46FA86D5-66CF-38A6-1E3B-651F204EFD5E}"/>
               </a:ext>
             </a:extLst>
           </p:cNvPr>
-          <p:cNvPicPr/>
+          <p:cNvPicPr>
+            <a:picLocks noChangeAspect="1"/>
+          </p:cNvPicPr>
           <p:nvPr/>
         </p:nvPicPr>
         <p:blipFill>
@@ -13638,24 +13621,12 @@
         </p:blipFill>
         <p:spPr>
           <a:xfrm>
-            <a:off x="1909833" y="2766813"/>
-            <a:ext cx="6142346" cy="3691077"/>
+            <a:off x="1859426" y="2761719"/>
+            <a:ext cx="6354062" cy="4353533"/>
           </a:xfrm>
           <a:prstGeom prst="rect">
             <a:avLst/>
           </a:prstGeom>
-          <a:ln w="88900" cap="sq" cmpd="thickThin">
-            <a:solidFill>
-              <a:srgbClr val="000000"/>
-            </a:solidFill>
-            <a:prstDash val="solid"/>
-            <a:miter lim="800000"/>
-          </a:ln>
-          <a:effectLst>
-            <a:innerShdw blurRad="76200">
-              <a:srgbClr val="000000"/>
-            </a:innerShdw>
-          </a:effectLst>
         </p:spPr>
       </p:pic>
     </p:spTree>
@@ -14438,14 +14409,16 @@
       </p:grpSp>
       <p:pic>
         <p:nvPicPr>
-          <p:cNvPr id="20" name="Imagen 19">
+          <p:cNvPr id="5" name="Imagen 4">
             <a:extLst>
               <a:ext uri="{FF2B5EF4-FFF2-40B4-BE49-F238E27FC236}">
-                <a16:creationId xmlns:a16="http://schemas.microsoft.com/office/drawing/2014/main" id="{534DA4C7-2943-4498-AC60-CC8C66BFBE0B}"/>
+                <a16:creationId xmlns:a16="http://schemas.microsoft.com/office/drawing/2014/main" id="{971239D5-FF1F-D524-FE5E-37BD52303564}"/>
               </a:ext>
             </a:extLst>
           </p:cNvPr>
-          <p:cNvPicPr/>
+          <p:cNvPicPr>
+            <a:picLocks noChangeAspect="1"/>
+          </p:cNvPicPr>
           <p:nvPr/>
         </p:nvPicPr>
         <p:blipFill>
@@ -14456,64 +14429,12 @@
         </p:blipFill>
         <p:spPr>
           <a:xfrm>
-            <a:off x="572207" y="3085285"/>
-            <a:ext cx="4136376" cy="3041818"/>
+            <a:off x="197583" y="2838294"/>
+            <a:ext cx="8360229" cy="3819651"/>
           </a:xfrm>
           <a:prstGeom prst="rect">
             <a:avLst/>
           </a:prstGeom>
-          <a:ln w="88900" cap="sq" cmpd="thickThin">
-            <a:solidFill>
-              <a:srgbClr val="000000"/>
-            </a:solidFill>
-            <a:prstDash val="solid"/>
-            <a:miter lim="800000"/>
-          </a:ln>
-          <a:effectLst>
-            <a:innerShdw blurRad="76200">
-              <a:srgbClr val="000000"/>
-            </a:innerShdw>
-          </a:effectLst>
-        </p:spPr>
-      </p:pic>
-      <p:pic>
-        <p:nvPicPr>
-          <p:cNvPr id="21" name="Imagen 20">
-            <a:extLst>
-              <a:ext uri="{FF2B5EF4-FFF2-40B4-BE49-F238E27FC236}">
-                <a16:creationId xmlns:a16="http://schemas.microsoft.com/office/drawing/2014/main" id="{EB26E0F1-B91F-4DD1-8BEB-0A311A41A5B0}"/>
-              </a:ext>
-            </a:extLst>
-          </p:cNvPr>
-          <p:cNvPicPr/>
-          <p:nvPr/>
-        </p:nvPicPr>
-        <p:blipFill>
-          <a:blip r:embed="rId3"/>
-          <a:stretch>
-            <a:fillRect/>
-          </a:stretch>
-        </p:blipFill>
-        <p:spPr>
-          <a:xfrm>
-            <a:off x="4840122" y="3085303"/>
-            <a:ext cx="4153754" cy="3070542"/>
-          </a:xfrm>
-          <a:prstGeom prst="rect">
-            <a:avLst/>
-          </a:prstGeom>
-          <a:ln w="88900" cap="sq" cmpd="thickThin">
-            <a:solidFill>
-              <a:srgbClr val="000000"/>
-            </a:solidFill>
-            <a:prstDash val="solid"/>
-            <a:miter lim="800000"/>
-          </a:ln>
-          <a:effectLst>
-            <a:innerShdw blurRad="76200">
-              <a:srgbClr val="000000"/>
-            </a:innerShdw>
-          </a:effectLst>
         </p:spPr>
       </p:pic>
     </p:spTree>
@@ -15288,14 +15209,16 @@
       </p:grpSp>
       <p:pic>
         <p:nvPicPr>
-          <p:cNvPr id="10" name="Imagen 9">
+          <p:cNvPr id="5" name="Imagen 4">
             <a:extLst>
               <a:ext uri="{FF2B5EF4-FFF2-40B4-BE49-F238E27FC236}">
-                <a16:creationId xmlns:a16="http://schemas.microsoft.com/office/drawing/2014/main" id="{EF6C417C-0853-46FC-8E8D-D5E60C1CDB3C}"/>
+                <a16:creationId xmlns:a16="http://schemas.microsoft.com/office/drawing/2014/main" id="{591A8657-4DF0-636E-AFAF-3F363F2D3F7F}"/>
               </a:ext>
             </a:extLst>
           </p:cNvPr>
-          <p:cNvPicPr/>
+          <p:cNvPicPr>
+            <a:picLocks noChangeAspect="1"/>
+          </p:cNvPicPr>
           <p:nvPr/>
         </p:nvPicPr>
         <p:blipFill>
@@ -15306,24 +15229,12 @@
         </p:blipFill>
         <p:spPr>
           <a:xfrm>
-            <a:off x="1909833" y="2766813"/>
-            <a:ext cx="6142346" cy="3691077"/>
+            <a:off x="2116862" y="2855041"/>
+            <a:ext cx="5868219" cy="3972479"/>
           </a:xfrm>
           <a:prstGeom prst="rect">
             <a:avLst/>
           </a:prstGeom>
-          <a:ln w="88900" cap="sq" cmpd="thickThin">
-            <a:solidFill>
-              <a:srgbClr val="000000"/>
-            </a:solidFill>
-            <a:prstDash val="solid"/>
-            <a:miter lim="800000"/>
-          </a:ln>
-          <a:effectLst>
-            <a:innerShdw blurRad="76200">
-              <a:srgbClr val="000000"/>
-            </a:innerShdw>
-          </a:effectLst>
         </p:spPr>
       </p:pic>
     </p:spTree>
@@ -15477,6 +15388,13 @@
             <a:schemeClr val="lt1"/>
           </a:fontRef>
         </p:style>
+        <p:txBody>
+          <a:bodyPr/>
+          <a:lstStyle/>
+          <a:p>
+            <a:endParaRPr lang="es-EC"/>
+          </a:p>
+        </p:txBody>
       </p:sp>
       <p:pic>
         <p:nvPicPr>
@@ -16839,14 +16757,16 @@
       </p:grpSp>
       <p:pic>
         <p:nvPicPr>
-          <p:cNvPr id="11" name="Imagen 10">
+          <p:cNvPr id="5" name="Imagen 4">
             <a:extLst>
               <a:ext uri="{FF2B5EF4-FFF2-40B4-BE49-F238E27FC236}">
-                <a16:creationId xmlns:a16="http://schemas.microsoft.com/office/drawing/2014/main" id="{559FF776-7A94-421E-9114-73FB5B1255DE}"/>
+                <a16:creationId xmlns:a16="http://schemas.microsoft.com/office/drawing/2014/main" id="{D4504386-7452-CDC4-BA05-A9A4C3B26C2B}"/>
               </a:ext>
             </a:extLst>
           </p:cNvPr>
-          <p:cNvPicPr/>
+          <p:cNvPicPr>
+            <a:picLocks noChangeAspect="1"/>
+          </p:cNvPicPr>
           <p:nvPr/>
         </p:nvPicPr>
         <p:blipFill>
@@ -16857,24 +16777,12 @@
         </p:blipFill>
         <p:spPr>
           <a:xfrm>
-            <a:off x="1894449" y="2590116"/>
-            <a:ext cx="5507734" cy="3570484"/>
+            <a:off x="732994" y="2609255"/>
+            <a:ext cx="7830643" cy="4048690"/>
           </a:xfrm>
           <a:prstGeom prst="rect">
             <a:avLst/>
           </a:prstGeom>
-          <a:ln w="88900" cap="sq" cmpd="thickThin">
-            <a:solidFill>
-              <a:srgbClr val="000000"/>
-            </a:solidFill>
-            <a:prstDash val="solid"/>
-            <a:miter lim="800000"/>
-          </a:ln>
-          <a:effectLst>
-            <a:innerShdw blurRad="76200">
-              <a:srgbClr val="000000"/>
-            </a:innerShdw>
-          </a:effectLst>
         </p:spPr>
       </p:pic>
     </p:spTree>
@@ -17662,42 +17570,31 @@
       </p:grpSp>
       <p:pic>
         <p:nvPicPr>
-          <p:cNvPr id="12" name="Imagen 11">
+          <p:cNvPr id="5" name="Imagen 4">
             <a:extLst>
               <a:ext uri="{FF2B5EF4-FFF2-40B4-BE49-F238E27FC236}">
-                <a16:creationId xmlns:a16="http://schemas.microsoft.com/office/drawing/2014/main" id="{94DA7CFB-4785-47A9-85A1-8D24CBBEF2CF}"/>
+                <a16:creationId xmlns:a16="http://schemas.microsoft.com/office/drawing/2014/main" id="{8F7BDF9B-4DED-BBAE-EAFC-09463E4C3CA5}"/>
               </a:ext>
             </a:extLst>
           </p:cNvPr>
-          <p:cNvPicPr/>
+          <p:cNvPicPr>
+            <a:picLocks noChangeAspect="1"/>
+          </p:cNvPicPr>
           <p:nvPr/>
         </p:nvPicPr>
-        <p:blipFill>
+        <p:blipFill rotWithShape="1">
           <a:blip r:embed="rId2"/>
-          <a:stretch>
-            <a:fillRect/>
-          </a:stretch>
+          <a:srcRect l="-1027" t="-2013" r="40868" b="2013"/>
+          <a:stretch/>
         </p:blipFill>
         <p:spPr>
           <a:xfrm>
-            <a:off x="1800269" y="2972509"/>
-            <a:ext cx="6074490" cy="3222106"/>
+            <a:off x="1378124" y="2810006"/>
+            <a:ext cx="5835477" cy="3647884"/>
           </a:xfrm>
           <a:prstGeom prst="rect">
             <a:avLst/>
           </a:prstGeom>
-          <a:ln w="88900" cap="sq" cmpd="thickThin">
-            <a:solidFill>
-              <a:srgbClr val="000000"/>
-            </a:solidFill>
-            <a:prstDash val="solid"/>
-            <a:miter lim="800000"/>
-          </a:ln>
-          <a:effectLst>
-            <a:innerShdw blurRad="76200">
-              <a:srgbClr val="000000"/>
-            </a:innerShdw>
-          </a:effectLst>
         </p:spPr>
       </p:pic>
     </p:spTree>
@@ -33456,7 +33353,7 @@
                 <a:ea typeface="+mn-lt"/>
                 <a:cs typeface="+mn-lt"/>
               </a:rPr>
-              <a:t>Java es según la definición dada por [1] es un lenguaje de programación ampliamente utilizado para codificar aplicaciones de distintos indoles, desde aplicaciones de escritorio hasta tipo web, pasando por desarrollo de videojuegos, macrodatos, IA e </a:t>
+              <a:t>Java es un lenguaje de programación ampliamente utilizado para codificar aplicaciones de distintos indoles, desde aplicaciones de escritorio hasta tipo web, pasando por desarrollo de videojuegos, macrodatos, IA e </a:t>
             </a:r>
             <a:r>
               <a:rPr lang="es-MX" sz="1800" dirty="0" err="1">
@@ -33476,7 +33373,20 @@
                 <a:ea typeface="+mn-lt"/>
                 <a:cs typeface="+mn-lt"/>
               </a:rPr>
-              <a:t>. Actualmente la ultima versión numero 8 y cuenta con 3 versiones disponibles de Java las cuales son Java SE, Java EE y Java ME.</a:t>
+              <a:t>. </a:t>
+            </a:r>
+          </a:p>
+          <a:p>
+            <a:pPr marL="899795" lvl="2" indent="-269875" algn="just"/>
+            <a:r>
+              <a:rPr lang="es-MX" sz="1800" dirty="0">
+                <a:solidFill>
+                  <a:schemeClr val="tx1"/>
+                </a:solidFill>
+                <a:ea typeface="+mn-lt"/>
+                <a:cs typeface="+mn-lt"/>
+              </a:rPr>
+              <a:t>Actualmente la ultima versión numero 8 y cuenta con 3 versiones disponibles de Java las cuales son Java SE, Java EE y Java ME.</a:t>
             </a:r>
           </a:p>
           <a:p>
@@ -36748,7 +36658,7 @@
                   <a:schemeClr val="tx1"/>
                 </a:solidFill>
               </a:rPr>
-              <a:t> es [2] un entorno de desarrollo integrado (IDE) creado para principalmente el lenguaje de programación de Java, anteriormente conocido simplemente como </a:t>
+              <a:t> es un entorno de desarrollo integrado (IDE) creado para principalmente el lenguaje de programación de Java, anteriormente conocido simplemente como </a:t>
             </a:r>
             <a:r>
               <a:rPr lang="es-MX" dirty="0" err="1">
@@ -37596,7 +37506,7 @@
                   <a:schemeClr val="tx1"/>
                 </a:solidFill>
               </a:rPr>
-              <a:t>La concurrencia es [3] la ejecución de varios procesos a la vez, es decir, es la ejecución simultánea de múltiples tareas interactivamente. Estas tareas pueden ser un conjunto de procesos o hilos de ejecución creados por un único programa. Las tareas se pueden ejecutar en una sola CPU (multiprogramación), en varios procesadores, o en una red de computadores distribuidos. </a:t>
+              <a:t>La concurrencia es la ejecución de varios procesos a la vez, es decir, es la ejecución simultánea de múltiples tareas interactivamente. Estas tareas pueden ser un conjunto de procesos o hilos de ejecución creados por un único programa. Las tareas se pueden ejecutar en una sola CPU (multiprogramación), en varios procesadores, o en una red de computadores distribuidos. </a:t>
             </a:r>
             <a:endParaRPr lang="es-ES" dirty="0">
               <a:solidFill>
@@ -38398,7 +38308,7 @@
                   <a:schemeClr val="tx1"/>
                 </a:solidFill>
               </a:rPr>
-              <a:t>Un hilo es [3]  un flujo de control dentro de un programa. Creando varios hilos podremos realizar varias tareas simultáneamente. Cada hilo tendrá sólo un contexto de ejecución (contador de programa, pila de ejecución). Es decir, a diferencia de los procesos UNIX, no tienen su propio espacio de memoria, sino que acceden todos al mismo espacio de memoria común, por lo que será importante su sincronización cuando tengamos varios hilos accediendo a los mismos objetos.</a:t>
+              <a:t>Un hilo es un flujo de control dentro de un programa. Creando varios hilos podremos realizar varias tareas simultáneamente. Cada hilo tendrá sólo un contexto de ejecución (contador de programa, pila de ejecución). Es decir, a diferencia de los procesos UNIX, no tienen su propio espacio de memoria, sino que acceden todos al mismo espacio de memoria común, por lo que será importante su sincronización cuando tengamos varios hilos accediendo a los mismos objetos.</a:t>
             </a:r>
           </a:p>
           <a:p>
@@ -39173,15 +39083,15 @@
               </a:spcBef>
             </a:pPr>
             <a:r>
-              <a:rPr lang="es-EC">
+              <a:rPr lang="es-EC" dirty="0">
                 <a:solidFill>
                   <a:schemeClr val="tx1"/>
                 </a:solidFill>
               </a:rPr>
-              <a:t>Un JavaBean es [6] una clase destinada a almacenar una cantidad de datos e información de nuestro programa y cuyo principal fin es la de encapsular información para ser utilizada cuando se la llame o necesite, por lo general esta práctica se realiza con el fin de reutilizar código fuente o estructurar el código en unidades lo más sencillas posibles para ser consumidas.</a:t>
+              <a:t>Un JavaBean es una clase destinada a almacenar una cantidad de datos e información de nuestro programa y cuyo principal fin es la de encapsular información para ser utilizada cuando se la llame o necesite, por lo general esta práctica se realiza con el fin de reutilizar código fuente o estructurar el código en unidades lo más sencillas posibles para ser consumidas.</a:t>
             </a:r>
             <a:r>
-              <a:rPr lang="es-ES">
+              <a:rPr lang="es-ES" dirty="0">
                 <a:solidFill>
                   <a:schemeClr val="tx1"/>
                 </a:solidFill>
@@ -39193,7 +39103,7 @@
             <a:pPr marL="0" indent="0">
               <a:buNone/>
             </a:pPr>
-            <a:endParaRPr lang="es-ES">
+            <a:endParaRPr lang="es-ES" dirty="0">
               <a:solidFill>
                 <a:schemeClr val="tx1"/>
               </a:solidFill>
@@ -41205,21 +41115,6 @@
 </file>
 
 <file path=customXml/item1.xml><?xml version="1.0" encoding="utf-8"?>
-<p:properties xmlns:p="http://schemas.microsoft.com/office/2006/metadata/properties" xmlns:xsi="http://www.w3.org/2001/XMLSchema-instance" xmlns:pc="http://schemas.microsoft.com/office/infopath/2007/PartnerControls">
-  <documentManagement/>
-</p:properties>
-</file>
-
-<file path=customXml/item2.xml><?xml version="1.0" encoding="utf-8"?>
-<?mso-contentType ?>
-<FormTemplates xmlns="http://schemas.microsoft.com/sharepoint/v3/contenttype/forms">
-  <Display>DocumentLibraryForm</Display>
-  <Edit>DocumentLibraryForm</Edit>
-  <New>DocumentLibraryForm</New>
-</FormTemplates>
-</file>
-
-<file path=customXml/item3.xml><?xml version="1.0" encoding="utf-8"?>
 <ct:contentTypeSchema xmlns:ct="http://schemas.microsoft.com/office/2006/metadata/contentType" xmlns:ma="http://schemas.microsoft.com/office/2006/metadata/properties/metaAttributes" ct:_="" ma:_="" ma:contentTypeName="Documento" ma:contentTypeID="0x010100C854A3B6139C2F4CA267C833574EC0B2" ma:contentTypeVersion="7" ma:contentTypeDescription="Crear nuevo documento." ma:contentTypeScope="" ma:versionID="7eff8e76f9b73fd43022abad00f5e571">
   <xsd:schema xmlns:xsd="http://www.w3.org/2001/XMLSchema" xmlns:xs="http://www.w3.org/2001/XMLSchema" xmlns:p="http://schemas.microsoft.com/office/2006/metadata/properties" xmlns:ns3="757c851f-a54b-415f-9d4a-84ace0105453" xmlns:ns4="fabca9b8-e3d4-4b8b-aadf-8632b399ac5a" targetNamespace="http://schemas.microsoft.com/office/2006/metadata/properties" ma:root="true" ma:fieldsID="bd593ea182a9448b443016ba10a5b4bf" ns3:_="" ns4:_="">
     <xsd:import namespace="757c851f-a54b-415f-9d4a-84ace0105453"/>
@@ -41404,7 +41299,41 @@
 </ct:contentTypeSchema>
 </file>
 
+<file path=customXml/item2.xml><?xml version="1.0" encoding="utf-8"?>
+<p:properties xmlns:p="http://schemas.microsoft.com/office/2006/metadata/properties" xmlns:xsi="http://www.w3.org/2001/XMLSchema-instance" xmlns:pc="http://schemas.microsoft.com/office/infopath/2007/PartnerControls">
+  <documentManagement/>
+</p:properties>
+</file>
+
+<file path=customXml/item3.xml><?xml version="1.0" encoding="utf-8"?>
+<?mso-contentType ?>
+<FormTemplates xmlns="http://schemas.microsoft.com/sharepoint/v3/contenttype/forms">
+  <Display>DocumentLibraryForm</Display>
+  <Edit>DocumentLibraryForm</Edit>
+  <New>DocumentLibraryForm</New>
+</FormTemplates>
+</file>
+
 <file path=customXml/itemProps1.xml><?xml version="1.0" encoding="utf-8"?>
+<ds:datastoreItem xmlns:ds="http://schemas.openxmlformats.org/officeDocument/2006/customXml" ds:itemID="{181294FA-BF06-4978-9A7F-A70E0F9AD214}">
+  <ds:schemaRefs>
+    <ds:schemaRef ds:uri="757c851f-a54b-415f-9d4a-84ace0105453"/>
+    <ds:schemaRef ds:uri="fabca9b8-e3d4-4b8b-aadf-8632b399ac5a"/>
+    <ds:schemaRef ds:uri="http://purl.org/dc/elements/1.1/"/>
+    <ds:schemaRef ds:uri="http://purl.org/dc/terms/"/>
+    <ds:schemaRef ds:uri="http://schemas.microsoft.com/internal/obd"/>
+    <ds:schemaRef ds:uri="http://schemas.microsoft.com/office/2006/documentManagement/types"/>
+    <ds:schemaRef ds:uri="http://schemas.microsoft.com/office/2006/metadata/contentType"/>
+    <ds:schemaRef ds:uri="http://schemas.microsoft.com/office/2006/metadata/properties"/>
+    <ds:schemaRef ds:uri="http://schemas.microsoft.com/office/2006/metadata/properties/metaAttributes"/>
+    <ds:schemaRef ds:uri="http://schemas.microsoft.com/office/infopath/2007/PartnerControls"/>
+    <ds:schemaRef ds:uri="http://schemas.openxmlformats.org/package/2006/metadata/core-properties"/>
+    <ds:schemaRef ds:uri="http://www.w3.org/2001/XMLSchema"/>
+  </ds:schemaRefs>
+</ds:datastoreItem>
+</file>
+
+<file path=customXml/itemProps2.xml><?xml version="1.0" encoding="utf-8"?>
 <ds:datastoreItem xmlns:ds="http://schemas.openxmlformats.org/officeDocument/2006/customXml" ds:itemID="{E476FF2B-C098-40B2-8C02-A6808430CAFA}">
   <ds:schemaRefs>
     <ds:schemaRef ds:uri="757c851f-a54b-415f-9d4a-84ace0105453"/>
@@ -41421,29 +41350,10 @@
 </ds:datastoreItem>
 </file>
 
-<file path=customXml/itemProps2.xml><?xml version="1.0" encoding="utf-8"?>
+<file path=customXml/itemProps3.xml><?xml version="1.0" encoding="utf-8"?>
 <ds:datastoreItem xmlns:ds="http://schemas.openxmlformats.org/officeDocument/2006/customXml" ds:itemID="{F3DCAEA0-94B1-4E6A-AD26-F5EDE5307CAC}">
   <ds:schemaRefs>
     <ds:schemaRef ds:uri="http://schemas.microsoft.com/sharepoint/v3/contenttype/forms"/>
   </ds:schemaRefs>
 </ds:datastoreItem>
-</file>
-
-<file path=customXml/itemProps3.xml><?xml version="1.0" encoding="utf-8"?>
-<ds:datastoreItem xmlns:ds="http://schemas.openxmlformats.org/officeDocument/2006/customXml" ds:itemID="{181294FA-BF06-4978-9A7F-A70E0F9AD214}">
-  <ds:schemaRefs>
-    <ds:schemaRef ds:uri="757c851f-a54b-415f-9d4a-84ace0105453"/>
-    <ds:schemaRef ds:uri="fabca9b8-e3d4-4b8b-aadf-8632b399ac5a"/>
-    <ds:schemaRef ds:uri="http://purl.org/dc/elements/1.1/"/>
-    <ds:schemaRef ds:uri="http://purl.org/dc/terms/"/>
-    <ds:schemaRef ds:uri="http://schemas.microsoft.com/internal/obd"/>
-    <ds:schemaRef ds:uri="http://schemas.microsoft.com/office/2006/documentManagement/types"/>
-    <ds:schemaRef ds:uri="http://schemas.microsoft.com/office/2006/metadata/contentType"/>
-    <ds:schemaRef ds:uri="http://schemas.microsoft.com/office/2006/metadata/properties"/>
-    <ds:schemaRef ds:uri="http://schemas.microsoft.com/office/2006/metadata/properties/metaAttributes"/>
-    <ds:schemaRef ds:uri="http://schemas.microsoft.com/office/infopath/2007/PartnerControls"/>
-    <ds:schemaRef ds:uri="http://schemas.openxmlformats.org/package/2006/metadata/core-properties"/>
-    <ds:schemaRef ds:uri="http://www.w3.org/2001/XMLSchema"/>
-  </ds:schemaRefs>
-</ds:datastoreItem>
 </file>
</xml_diff>

<commit_message>
Actualizacion documentacion y ejercicio 169
</commit_message>
<xml_diff>
--- a/HilosJava_Grupo2/DOCUMENTACION/HilosJava_168_169_170_Grupo2.pptx
+++ b/HilosJava_Grupo2/DOCUMENTACION/HilosJava_168_169_170_Grupo2.pptx
@@ -2620,7 +2620,7 @@
           <a:p>
             <a:fld id="{3E0690D5-D519-41DB-B4EF-34C6DC34EE12}" type="datetimeFigureOut">
               <a:rPr lang="es-ES" smtClean="0"/>
-              <a:t>10/07/2023</a:t>
+              <a:t>12/07/2023</a:t>
             </a:fld>
             <a:endParaRPr lang="es-ES"/>
           </a:p>
@@ -3133,7 +3133,7 @@
             <a:fld id="{B61BEF0D-F0BB-DE4B-95CE-6DB70DBA9567}" type="datetimeFigureOut">
               <a:rPr lang="en-US" smtClean="0"/>
               <a:pPr/>
-              <a:t>7/10/2023</a:t>
+              <a:t>7/12/2023</a:t>
             </a:fld>
             <a:endParaRPr lang="en-US"/>
           </a:p>
@@ -3397,7 +3397,7 @@
             <a:fld id="{B61BEF0D-F0BB-DE4B-95CE-6DB70DBA9567}" type="datetimeFigureOut">
               <a:rPr lang="en-US" smtClean="0"/>
               <a:pPr/>
-              <a:t>7/10/2023</a:t>
+              <a:t>7/12/2023</a:t>
             </a:fld>
             <a:endParaRPr lang="en-US"/>
           </a:p>
@@ -3634,7 +3634,7 @@
             <a:fld id="{B61BEF0D-F0BB-DE4B-95CE-6DB70DBA9567}" type="datetimeFigureOut">
               <a:rPr lang="en-US" smtClean="0"/>
               <a:pPr/>
-              <a:t>7/10/2023</a:t>
+              <a:t>7/12/2023</a:t>
             </a:fld>
             <a:endParaRPr lang="en-US"/>
           </a:p>
@@ -3876,7 +3876,7 @@
             <a:fld id="{B61BEF0D-F0BB-DE4B-95CE-6DB70DBA9567}" type="datetimeFigureOut">
               <a:rPr lang="en-US" smtClean="0"/>
               <a:pPr/>
-              <a:t>7/10/2023</a:t>
+              <a:t>7/12/2023</a:t>
             </a:fld>
             <a:endParaRPr lang="en-US"/>
           </a:p>
@@ -4185,7 +4185,7 @@
             <a:fld id="{B61BEF0D-F0BB-DE4B-95CE-6DB70DBA9567}" type="datetimeFigureOut">
               <a:rPr lang="en-US" smtClean="0"/>
               <a:pPr/>
-              <a:t>7/10/2023</a:t>
+              <a:t>7/12/2023</a:t>
             </a:fld>
             <a:endParaRPr lang="en-US"/>
           </a:p>
@@ -4489,7 +4489,7 @@
             <a:fld id="{B61BEF0D-F0BB-DE4B-95CE-6DB70DBA9567}" type="datetimeFigureOut">
               <a:rPr lang="en-US" smtClean="0"/>
               <a:pPr/>
-              <a:t>7/10/2023</a:t>
+              <a:t>7/12/2023</a:t>
             </a:fld>
             <a:endParaRPr lang="en-US"/>
           </a:p>
@@ -4913,7 +4913,7 @@
             <a:fld id="{B61BEF0D-F0BB-DE4B-95CE-6DB70DBA9567}" type="datetimeFigureOut">
               <a:rPr lang="en-US" smtClean="0"/>
               <a:pPr/>
-              <a:t>7/10/2023</a:t>
+              <a:t>7/12/2023</a:t>
             </a:fld>
             <a:endParaRPr lang="en-US"/>
           </a:p>
@@ -5010,7 +5010,7 @@
             <a:fld id="{B61BEF0D-F0BB-DE4B-95CE-6DB70DBA9567}" type="datetimeFigureOut">
               <a:rPr lang="en-US" smtClean="0"/>
               <a:pPr/>
-              <a:t>7/10/2023</a:t>
+              <a:t>7/12/2023</a:t>
             </a:fld>
             <a:endParaRPr lang="en-US"/>
           </a:p>
@@ -5174,7 +5174,7 @@
             <a:fld id="{B61BEF0D-F0BB-DE4B-95CE-6DB70DBA9567}" type="datetimeFigureOut">
               <a:rPr lang="en-US" smtClean="0"/>
               <a:pPr/>
-              <a:t>7/10/2023</a:t>
+              <a:t>7/12/2023</a:t>
             </a:fld>
             <a:endParaRPr lang="en-US"/>
           </a:p>
@@ -5554,7 +5554,7 @@
             <a:fld id="{B61BEF0D-F0BB-DE4B-95CE-6DB70DBA9567}" type="datetimeFigureOut">
               <a:rPr lang="en-US" smtClean="0"/>
               <a:pPr/>
-              <a:t>7/10/2023</a:t>
+              <a:t>7/12/2023</a:t>
             </a:fld>
             <a:endParaRPr lang="en-US"/>
           </a:p>
@@ -5845,7 +5845,7 @@
             <a:fld id="{B61BEF0D-F0BB-DE4B-95CE-6DB70DBA9567}" type="datetimeFigureOut">
               <a:rPr lang="en-US" smtClean="0"/>
               <a:pPr/>
-              <a:t>7/10/2023</a:t>
+              <a:t>7/12/2023</a:t>
             </a:fld>
             <a:endParaRPr lang="en-US"/>
           </a:p>
@@ -6058,7 +6058,7 @@
             <a:fld id="{B61BEF0D-F0BB-DE4B-95CE-6DB70DBA9567}" type="datetimeFigureOut">
               <a:rPr lang="en-US" smtClean="0"/>
               <a:pPr/>
-              <a:t>7/10/2023</a:t>
+              <a:t>7/12/2023</a:t>
             </a:fld>
             <a:endParaRPr lang="en-US"/>
           </a:p>
@@ -32401,14 +32401,16 @@
       </p:grpSp>
       <p:pic>
         <p:nvPicPr>
-          <p:cNvPr id="10" name="Imagen 9">
+          <p:cNvPr id="4" name="Imagen 3">
             <a:extLst>
               <a:ext uri="{FF2B5EF4-FFF2-40B4-BE49-F238E27FC236}">
-                <a16:creationId xmlns:a16="http://schemas.microsoft.com/office/drawing/2014/main" id="{5B257D57-1BA0-4BE5-8BD6-C8DC31E9733D}"/>
+                <a16:creationId xmlns:a16="http://schemas.microsoft.com/office/drawing/2014/main" id="{F8CCE9FE-E7AA-07D7-86D4-79E52BE53C45}"/>
               </a:ext>
             </a:extLst>
           </p:cNvPr>
-          <p:cNvPicPr/>
+          <p:cNvPicPr>
+            <a:picLocks noChangeAspect="1"/>
+          </p:cNvPicPr>
           <p:nvPr/>
         </p:nvPicPr>
         <p:blipFill>
@@ -32419,24 +32421,12 @@
         </p:blipFill>
         <p:spPr>
           <a:xfrm>
-            <a:off x="1259729" y="2666800"/>
-            <a:ext cx="7281408" cy="3760610"/>
+            <a:off x="1094479" y="2613537"/>
+            <a:ext cx="7492308" cy="4213983"/>
           </a:xfrm>
           <a:prstGeom prst="rect">
             <a:avLst/>
           </a:prstGeom>
-          <a:ln w="88900" cap="sq" cmpd="thickThin">
-            <a:solidFill>
-              <a:srgbClr val="000000"/>
-            </a:solidFill>
-            <a:prstDash val="solid"/>
-            <a:miter lim="800000"/>
-          </a:ln>
-          <a:effectLst>
-            <a:innerShdw blurRad="76200">
-              <a:srgbClr val="000000"/>
-            </a:innerShdw>
-          </a:effectLst>
         </p:spPr>
       </p:pic>
     </p:spTree>
@@ -41115,6 +41105,21 @@
 </file>
 
 <file path=customXml/item1.xml><?xml version="1.0" encoding="utf-8"?>
+<p:properties xmlns:p="http://schemas.microsoft.com/office/2006/metadata/properties" xmlns:xsi="http://www.w3.org/2001/XMLSchema-instance" xmlns:pc="http://schemas.microsoft.com/office/infopath/2007/PartnerControls">
+  <documentManagement/>
+</p:properties>
+</file>
+
+<file path=customXml/item2.xml><?xml version="1.0" encoding="utf-8"?>
+<?mso-contentType ?>
+<FormTemplates xmlns="http://schemas.microsoft.com/sharepoint/v3/contenttype/forms">
+  <Display>DocumentLibraryForm</Display>
+  <Edit>DocumentLibraryForm</Edit>
+  <New>DocumentLibraryForm</New>
+</FormTemplates>
+</file>
+
+<file path=customXml/item3.xml><?xml version="1.0" encoding="utf-8"?>
 <ct:contentTypeSchema xmlns:ct="http://schemas.microsoft.com/office/2006/metadata/contentType" xmlns:ma="http://schemas.microsoft.com/office/2006/metadata/properties/metaAttributes" ct:_="" ma:_="" ma:contentTypeName="Documento" ma:contentTypeID="0x010100C854A3B6139C2F4CA267C833574EC0B2" ma:contentTypeVersion="7" ma:contentTypeDescription="Crear nuevo documento." ma:contentTypeScope="" ma:versionID="7eff8e76f9b73fd43022abad00f5e571">
   <xsd:schema xmlns:xsd="http://www.w3.org/2001/XMLSchema" xmlns:xs="http://www.w3.org/2001/XMLSchema" xmlns:p="http://schemas.microsoft.com/office/2006/metadata/properties" xmlns:ns3="757c851f-a54b-415f-9d4a-84ace0105453" xmlns:ns4="fabca9b8-e3d4-4b8b-aadf-8632b399ac5a" targetNamespace="http://schemas.microsoft.com/office/2006/metadata/properties" ma:root="true" ma:fieldsID="bd593ea182a9448b443016ba10a5b4bf" ns3:_="" ns4:_="">
     <xsd:import namespace="757c851f-a54b-415f-9d4a-84ace0105453"/>
@@ -41299,22 +41304,32 @@
 </ct:contentTypeSchema>
 </file>
 
-<file path=customXml/item2.xml><?xml version="1.0" encoding="utf-8"?>
-<p:properties xmlns:p="http://schemas.microsoft.com/office/2006/metadata/properties" xmlns:xsi="http://www.w3.org/2001/XMLSchema-instance" xmlns:pc="http://schemas.microsoft.com/office/infopath/2007/PartnerControls">
-  <documentManagement/>
-</p:properties>
+<file path=customXml/itemProps1.xml><?xml version="1.0" encoding="utf-8"?>
+<ds:datastoreItem xmlns:ds="http://schemas.openxmlformats.org/officeDocument/2006/customXml" ds:itemID="{E476FF2B-C098-40B2-8C02-A6808430CAFA}">
+  <ds:schemaRefs>
+    <ds:schemaRef ds:uri="757c851f-a54b-415f-9d4a-84ace0105453"/>
+    <ds:schemaRef ds:uri="fabca9b8-e3d4-4b8b-aadf-8632b399ac5a"/>
+    <ds:schemaRef ds:uri="http://purl.org/dc/dcmitype/"/>
+    <ds:schemaRef ds:uri="http://purl.org/dc/elements/1.1/"/>
+    <ds:schemaRef ds:uri="http://purl.org/dc/terms/"/>
+    <ds:schemaRef ds:uri="http://schemas.microsoft.com/office/2006/documentManagement/types"/>
+    <ds:schemaRef ds:uri="http://schemas.microsoft.com/office/2006/metadata/properties"/>
+    <ds:schemaRef ds:uri="http://schemas.microsoft.com/office/infopath/2007/PartnerControls"/>
+    <ds:schemaRef ds:uri="http://schemas.openxmlformats.org/package/2006/metadata/core-properties"/>
+    <ds:schemaRef ds:uri="http://www.w3.org/XML/1998/namespace"/>
+  </ds:schemaRefs>
+</ds:datastoreItem>
 </file>
 
-<file path=customXml/item3.xml><?xml version="1.0" encoding="utf-8"?>
-<?mso-contentType ?>
-<FormTemplates xmlns="http://schemas.microsoft.com/sharepoint/v3/contenttype/forms">
-  <Display>DocumentLibraryForm</Display>
-  <Edit>DocumentLibraryForm</Edit>
-  <New>DocumentLibraryForm</New>
-</FormTemplates>
+<file path=customXml/itemProps2.xml><?xml version="1.0" encoding="utf-8"?>
+<ds:datastoreItem xmlns:ds="http://schemas.openxmlformats.org/officeDocument/2006/customXml" ds:itemID="{F3DCAEA0-94B1-4E6A-AD26-F5EDE5307CAC}">
+  <ds:schemaRefs>
+    <ds:schemaRef ds:uri="http://schemas.microsoft.com/sharepoint/v3/contenttype/forms"/>
+  </ds:schemaRefs>
+</ds:datastoreItem>
 </file>
 
-<file path=customXml/itemProps1.xml><?xml version="1.0" encoding="utf-8"?>
+<file path=customXml/itemProps3.xml><?xml version="1.0" encoding="utf-8"?>
 <ds:datastoreItem xmlns:ds="http://schemas.openxmlformats.org/officeDocument/2006/customXml" ds:itemID="{181294FA-BF06-4978-9A7F-A70E0F9AD214}">
   <ds:schemaRefs>
     <ds:schemaRef ds:uri="757c851f-a54b-415f-9d4a-84ace0105453"/>
@@ -41331,29 +41346,4 @@
     <ds:schemaRef ds:uri="http://www.w3.org/2001/XMLSchema"/>
   </ds:schemaRefs>
 </ds:datastoreItem>
-</file>
-
-<file path=customXml/itemProps2.xml><?xml version="1.0" encoding="utf-8"?>
-<ds:datastoreItem xmlns:ds="http://schemas.openxmlformats.org/officeDocument/2006/customXml" ds:itemID="{E476FF2B-C098-40B2-8C02-A6808430CAFA}">
-  <ds:schemaRefs>
-    <ds:schemaRef ds:uri="757c851f-a54b-415f-9d4a-84ace0105453"/>
-    <ds:schemaRef ds:uri="fabca9b8-e3d4-4b8b-aadf-8632b399ac5a"/>
-    <ds:schemaRef ds:uri="http://purl.org/dc/dcmitype/"/>
-    <ds:schemaRef ds:uri="http://purl.org/dc/elements/1.1/"/>
-    <ds:schemaRef ds:uri="http://purl.org/dc/terms/"/>
-    <ds:schemaRef ds:uri="http://schemas.microsoft.com/office/2006/documentManagement/types"/>
-    <ds:schemaRef ds:uri="http://schemas.microsoft.com/office/2006/metadata/properties"/>
-    <ds:schemaRef ds:uri="http://schemas.microsoft.com/office/infopath/2007/PartnerControls"/>
-    <ds:schemaRef ds:uri="http://schemas.openxmlformats.org/package/2006/metadata/core-properties"/>
-    <ds:schemaRef ds:uri="http://www.w3.org/XML/1998/namespace"/>
-  </ds:schemaRefs>
-</ds:datastoreItem>
-</file>
-
-<file path=customXml/itemProps3.xml><?xml version="1.0" encoding="utf-8"?>
-<ds:datastoreItem xmlns:ds="http://schemas.openxmlformats.org/officeDocument/2006/customXml" ds:itemID="{F3DCAEA0-94B1-4E6A-AD26-F5EDE5307CAC}">
-  <ds:schemaRefs>
-    <ds:schemaRef ds:uri="http://schemas.microsoft.com/sharepoint/v3/contenttype/forms"/>
-  </ds:schemaRefs>
-</ds:datastoreItem>
 </file>
</xml_diff>